<commit_message>
Complete project + update slides
</commit_message>
<xml_diff>
--- a/Data Preprocessing.pptx
+++ b/Data Preprocessing.pptx
@@ -39,6 +39,7 @@
     <p:sldId id="287" r:id="rId33"/>
     <p:sldId id="288" r:id="rId34"/>
     <p:sldId id="289" r:id="rId35"/>
+    <p:sldId id="290" r:id="rId36"/>
   </p:sldIdLst>
   <p:sldSz cx="12192000" cy="6858000"/>
   <p:notesSz cx="6858000" cy="9144000"/>
@@ -6465,12 +6466,32 @@
         </p:nvSpPr>
         <p:spPr/>
         <p:txBody>
-          <a:bodyPr/>
+          <a:bodyPr>
+            <a:normAutofit lnSpcReduction="10000"/>
+          </a:bodyPr>
           <a:lstStyle/>
           <a:p>
             <a:r>
               <a:rPr lang="en-US" dirty="0"/>
-              <a:t>Presented By: Talha Ahmed Siddiqui</a:t>
+              <a:t>Presented By:</a:t>
+            </a:r>
+          </a:p>
+          <a:p>
+            <a:r>
+              <a:rPr lang="en-US" dirty="0"/>
+              <a:t>Talha Ahmed Siddiqui</a:t>
+            </a:r>
+          </a:p>
+          <a:p>
+            <a:r>
+              <a:rPr lang="en-US" dirty="0"/>
+              <a:t>BSAI–F23-A</a:t>
+            </a:r>
+          </a:p>
+          <a:p>
+            <a:r>
+              <a:rPr lang="en-US" dirty="0"/>
+              <a:t>231230</a:t>
             </a:r>
           </a:p>
         </p:txBody>
@@ -6699,7 +6720,15 @@
           <a:p>
             <a:r>
               <a:rPr lang="en-US" dirty="0"/>
-              <a:t>Typically used for categorical data (e.g., gender or product category), where filling with the most common value makes sense.</a:t>
+              <a:t>Typically used for </a:t>
+            </a:r>
+            <a:r>
+              <a:rPr lang="en-US" b="1" dirty="0"/>
+              <a:t>categorical data </a:t>
+            </a:r>
+            <a:r>
+              <a:rPr lang="en-US" dirty="0"/>
+              <a:t>(e.g., gender or product category), where filling with the most common value makes sense.</a:t>
             </a:r>
           </a:p>
           <a:p>
@@ -6804,13 +6833,29 @@
           <a:p>
             <a:r>
               <a:rPr lang="en-US" dirty="0"/>
-              <a:t>Entire rows or columns where there are too many missing values (beyond a certain defined threshold) can be removed.</a:t>
-            </a:r>
-          </a:p>
-          <a:p>
-            <a:r>
-              <a:rPr lang="en-US" dirty="0"/>
-              <a:t>Similarly, if a column contains a constant value across most or all rows, it will not contribute to identifying patterns in the data.</a:t>
+              <a:t>Entire rows or columns where there are </a:t>
+            </a:r>
+            <a:r>
+              <a:rPr lang="en-US" b="1" dirty="0"/>
+              <a:t>too many missing values </a:t>
+            </a:r>
+            <a:r>
+              <a:rPr lang="en-US" dirty="0"/>
+              <a:t>(beyond a certain defined threshold) can be removed.</a:t>
+            </a:r>
+          </a:p>
+          <a:p>
+            <a:r>
+              <a:rPr lang="en-US" dirty="0"/>
+              <a:t>Similarly, if a column contains a </a:t>
+            </a:r>
+            <a:r>
+              <a:rPr lang="en-US" b="1" dirty="0"/>
+              <a:t>constant value </a:t>
+            </a:r>
+            <a:r>
+              <a:rPr lang="en-US" dirty="0"/>
+              <a:t>across most or all rows, it will not contribute to identifying patterns in the data.</a:t>
             </a:r>
           </a:p>
           <a:p>
@@ -7584,7 +7629,15 @@
           <a:p>
             <a:r>
               <a:rPr lang="en-US" dirty="0"/>
-              <a:t>Outliers are data points that deviate significantly from the rest of the dataset. They can be unusually high or low values compared to the expected range.</a:t>
+              <a:t>Outliers are data points that </a:t>
+            </a:r>
+            <a:r>
+              <a:rPr lang="en-US" b="1" dirty="0"/>
+              <a:t>deviate significantly </a:t>
+            </a:r>
+            <a:r>
+              <a:rPr lang="en-US" dirty="0"/>
+              <a:t>from the rest of the dataset. They can be unusually high or low values compared to the expected range.</a:t>
             </a:r>
           </a:p>
           <a:p>
@@ -8168,6 +8221,16 @@
             <a:r>
               <a:rPr lang="en-US" dirty="0"/>
               <a:t>Impact of Preprocessing</a:t>
+            </a:r>
+          </a:p>
+          <a:p>
+            <a:pPr marL="514350" indent="-514350" algn="just">
+              <a:buFont typeface="+mj-lt"/>
+              <a:buAutoNum type="arabicParenR"/>
+            </a:pPr>
+            <a:r>
+              <a:rPr lang="en-US" dirty="0"/>
+              <a:t>Next Steps</a:t>
             </a:r>
           </a:p>
         </p:txBody>
@@ -12811,6 +12874,152 @@
 </p:sld>
 </file>
 
+<file path=ppt/slides/slide35.xml><?xml version="1.0" encoding="utf-8"?>
+<p:sld xmlns:a="http://schemas.openxmlformats.org/drawingml/2006/main" xmlns:r="http://schemas.openxmlformats.org/officeDocument/2006/relationships" xmlns:p="http://schemas.openxmlformats.org/presentationml/2006/main">
+  <p:cSld>
+    <p:spTree>
+      <p:nvGrpSpPr>
+        <p:cNvPr id="1" name=""/>
+        <p:cNvGrpSpPr/>
+        <p:nvPr/>
+      </p:nvGrpSpPr>
+      <p:grpSpPr>
+        <a:xfrm>
+          <a:off x="0" y="0"/>
+          <a:ext cx="0" cy="0"/>
+          <a:chOff x="0" y="0"/>
+          <a:chExt cx="0" cy="0"/>
+        </a:xfrm>
+      </p:grpSpPr>
+      <p:sp>
+        <p:nvSpPr>
+          <p:cNvPr id="2" name="Title 1">
+            <a:extLst>
+              <a:ext uri="{FF2B5EF4-FFF2-40B4-BE49-F238E27FC236}">
+                <a16:creationId xmlns:a16="http://schemas.microsoft.com/office/drawing/2014/main" id="{A2F586D9-6273-8ACC-9D45-27A8942C82A3}"/>
+              </a:ext>
+            </a:extLst>
+          </p:cNvPr>
+          <p:cNvSpPr>
+            <a:spLocks noGrp="1"/>
+          </p:cNvSpPr>
+          <p:nvPr>
+            <p:ph type="title"/>
+          </p:nvPr>
+        </p:nvSpPr>
+        <p:spPr/>
+        <p:txBody>
+          <a:bodyPr/>
+          <a:lstStyle/>
+          <a:p>
+            <a:r>
+              <a:rPr lang="en-US" dirty="0"/>
+              <a:t>Next Steps</a:t>
+            </a:r>
+          </a:p>
+        </p:txBody>
+      </p:sp>
+      <p:sp>
+        <p:nvSpPr>
+          <p:cNvPr id="3" name="Content Placeholder 2">
+            <a:extLst>
+              <a:ext uri="{FF2B5EF4-FFF2-40B4-BE49-F238E27FC236}">
+                <a16:creationId xmlns:a16="http://schemas.microsoft.com/office/drawing/2014/main" id="{3BE87A52-6897-96C7-1A73-8A317F70B31D}"/>
+              </a:ext>
+            </a:extLst>
+          </p:cNvPr>
+          <p:cNvSpPr>
+            <a:spLocks noGrp="1"/>
+          </p:cNvSpPr>
+          <p:nvPr>
+            <p:ph idx="1"/>
+          </p:nvPr>
+        </p:nvSpPr>
+        <p:spPr/>
+        <p:txBody>
+          <a:bodyPr/>
+          <a:lstStyle/>
+          <a:p>
+            <a:pPr marL="514350" indent="-514350">
+              <a:buFont typeface="+mj-lt"/>
+              <a:buAutoNum type="arabicPeriod"/>
+            </a:pPr>
+            <a:r>
+              <a:rPr lang="en-US" dirty="0"/>
+              <a:t>EDA</a:t>
+            </a:r>
+          </a:p>
+          <a:p>
+            <a:pPr marL="457200" lvl="1" indent="0">
+              <a:buNone/>
+            </a:pPr>
+            <a:r>
+              <a:rPr lang="en-US" dirty="0"/>
+              <a:t>EDA helps you understand the characteristics of the dataset.</a:t>
+            </a:r>
+          </a:p>
+          <a:p>
+            <a:pPr marL="457200" lvl="1" indent="0">
+              <a:buNone/>
+            </a:pPr>
+            <a:r>
+              <a:rPr lang="en-US" dirty="0"/>
+              <a:t>It’s important to explore the cleaned data to ensure it’s ready for modeling or further analysis.</a:t>
+            </a:r>
+          </a:p>
+          <a:p>
+            <a:pPr marL="514350" indent="-514350">
+              <a:buFont typeface="+mj-lt"/>
+              <a:buAutoNum type="arabicPeriod"/>
+            </a:pPr>
+            <a:r>
+              <a:rPr lang="en-US" dirty="0"/>
+              <a:t>Feature Engineering</a:t>
+            </a:r>
+          </a:p>
+          <a:p>
+            <a:pPr marL="457200" lvl="1" indent="0">
+              <a:buNone/>
+            </a:pPr>
+            <a:r>
+              <a:rPr lang="en-US" dirty="0"/>
+              <a:t>If needed, you can create new features that might improve the performance of a machine learning model.</a:t>
+            </a:r>
+          </a:p>
+          <a:p>
+            <a:pPr marL="514350" indent="-514350">
+              <a:buFont typeface="+mj-lt"/>
+              <a:buAutoNum type="arabicPeriod"/>
+            </a:pPr>
+            <a:r>
+              <a:rPr lang="en-US" dirty="0"/>
+              <a:t>Model Selection</a:t>
+            </a:r>
+          </a:p>
+          <a:p>
+            <a:pPr marL="457200" lvl="1" indent="0">
+              <a:buNone/>
+            </a:pPr>
+            <a:r>
+              <a:rPr lang="en-US" dirty="0"/>
+              <a:t>If you're preparing the data for machine learning models, the next step would be to select a suitable model.</a:t>
+            </a:r>
+          </a:p>
+        </p:txBody>
+      </p:sp>
+    </p:spTree>
+    <p:extLst>
+      <p:ext uri="{BB962C8B-B14F-4D97-AF65-F5344CB8AC3E}">
+        <p14:creationId xmlns:p14="http://schemas.microsoft.com/office/powerpoint/2010/main" val="3287789951"/>
+      </p:ext>
+    </p:extLst>
+  </p:cSld>
+  <p:clrMapOvr>
+    <a:masterClrMapping/>
+  </p:clrMapOvr>
+</p:sld>
+</file>
+
 <file path=ppt/slides/slide4.xml><?xml version="1.0" encoding="utf-8"?>
 <p:sld xmlns:a="http://schemas.openxmlformats.org/drawingml/2006/main" xmlns:r="http://schemas.openxmlformats.org/officeDocument/2006/relationships" xmlns:p="http://schemas.openxmlformats.org/presentationml/2006/main">
   <p:cSld>
@@ -13437,7 +13646,15 @@
           <a:p>
             <a:r>
               <a:rPr lang="en-US" dirty="0"/>
-              <a:t>Best suited for numerical data that is symmetrically distributed (without many outliers).</a:t>
+              <a:t>Best suited for numerical data that is </a:t>
+            </a:r>
+            <a:r>
+              <a:rPr lang="en-US" b="1" dirty="0"/>
+              <a:t>symmetrically distributed </a:t>
+            </a:r>
+            <a:r>
+              <a:rPr lang="en-US" dirty="0"/>
+              <a:t>(without many outliers).</a:t>
             </a:r>
           </a:p>
           <a:p>

</xml_diff>